<commit_message>
Update slides for 2020-21; adding week 1
</commit_message>
<xml_diff>
--- a/COMP2x0-portfolio-workshop-02.pptx
+++ b/COMP2x0-portfolio-workshop-02.pptx
@@ -586,7 +586,7 @@
           <a:p>
             <a:fld id="{EA0C0817-A112-4847-8014-A94B7D2A4EA3}" type="datetime1">
               <a:rPr lang="en-US" smtClean="0"/>
-              <a:t>2/2/2020</a:t>
+              <a:t>1/21/2021</a:t>
             </a:fld>
             <a:endParaRPr lang="en-US" dirty="0"/>
           </a:p>
@@ -788,7 +788,7 @@
           <a:p>
             <a:fld id="{134F40B7-36AB-4376-BE14-EF7004D79BB9}" type="datetime1">
               <a:rPr lang="en-US" smtClean="0"/>
-              <a:t>2/2/2020</a:t>
+              <a:t>1/21/2021</a:t>
             </a:fld>
             <a:endParaRPr lang="en-US"/>
           </a:p>
@@ -968,7 +968,7 @@
           <a:p>
             <a:fld id="{FF87CAB8-DCAE-46A5-AADA-B3FAD11A54E0}" type="datetime1">
               <a:rPr lang="en-US" smtClean="0"/>
-              <a:t>2/2/2020</a:t>
+              <a:t>1/21/2021</a:t>
             </a:fld>
             <a:endParaRPr lang="en-US"/>
           </a:p>
@@ -1138,7 +1138,7 @@
           <a:p>
             <a:fld id="{7332B432-ACDA-4023-A761-2BAB76577B62}" type="datetime1">
               <a:rPr lang="en-US" smtClean="0"/>
-              <a:t>2/2/2020</a:t>
+              <a:t>1/21/2021</a:t>
             </a:fld>
             <a:endParaRPr lang="en-US"/>
           </a:p>
@@ -1737,7 +1737,7 @@
           <a:p>
             <a:fld id="{D9C646AA-F36E-4540-911D-FFFC0A0EF24A}" type="datetime1">
               <a:rPr lang="en-US" smtClean="0"/>
-              <a:t>2/2/2020</a:t>
+              <a:t>1/21/2021</a:t>
             </a:fld>
             <a:endParaRPr lang="en-US" dirty="0"/>
           </a:p>
@@ -2057,7 +2057,7 @@
           <a:p>
             <a:fld id="{69186D26-FA5F-4637-B602-B7C2DC34CFD4}" type="datetime1">
               <a:rPr lang="en-US" smtClean="0"/>
-              <a:t>2/2/2020</a:t>
+              <a:t>1/21/2021</a:t>
             </a:fld>
             <a:endParaRPr lang="en-US"/>
           </a:p>
@@ -2494,7 +2494,7 @@
           <a:p>
             <a:fld id="{8A7F15D8-96D1-4781-BC50-CA8A088B2FE4}" type="datetime1">
               <a:rPr lang="en-US" smtClean="0"/>
-              <a:t>2/2/2020</a:t>
+              <a:t>1/21/2021</a:t>
             </a:fld>
             <a:endParaRPr lang="en-US"/>
           </a:p>
@@ -2612,7 +2612,7 @@
           <a:p>
             <a:fld id="{F9A96C99-B8F8-4528-BD05-0E16E943DC09}" type="datetime1">
               <a:rPr lang="en-US" smtClean="0"/>
-              <a:t>2/2/2020</a:t>
+              <a:t>1/21/2021</a:t>
             </a:fld>
             <a:endParaRPr lang="en-US"/>
           </a:p>
@@ -2707,7 +2707,7 @@
           <a:p>
             <a:fld id="{03636942-C211-4B28-8DBD-C953E00AF71B}" type="datetime1">
               <a:rPr lang="en-US" smtClean="0"/>
-              <a:t>2/2/2020</a:t>
+              <a:t>1/21/2021</a:t>
             </a:fld>
             <a:endParaRPr lang="en-US"/>
           </a:p>
@@ -3124,7 +3124,7 @@
           <a:p>
             <a:fld id="{7E8D12A6-918A-48BD-8CB9-CA713993B0EA}" type="datetime1">
               <a:rPr lang="en-US" smtClean="0"/>
-              <a:t>2/2/2020</a:t>
+              <a:t>1/21/2021</a:t>
             </a:fld>
             <a:endParaRPr lang="en-US"/>
           </a:p>
@@ -3386,7 +3386,7 @@
             <a:fld id="{E778CE86-875F-4587-BCF6-FA054AFC0D53}" type="datetime1">
               <a:rPr lang="en-US" smtClean="0"/>
               <a:pPr/>
-              <a:t>2/2/2020</a:t>
+              <a:t>1/21/2021</a:t>
             </a:fld>
             <a:endParaRPr lang="en-US" dirty="0"/>
           </a:p>
@@ -3902,7 +3902,7 @@
           <a:p>
             <a:fld id="{F6FA2B21-3FCD-4721-B95C-427943F61125}" type="datetime1">
               <a:rPr lang="en-US" smtClean="0"/>
-              <a:t>2/2/2020</a:t>
+              <a:t>1/21/2021</a:t>
             </a:fld>
             <a:endParaRPr lang="en-US"/>
           </a:p>
@@ -4503,76 +4503,6 @@
           </a:effectLst>
         </p:spPr>
       </p:sp>
-      <p:sp>
-        <p:nvSpPr>
-          <p:cNvPr id="2" name="Title 1">
-            <a:extLst>
-              <a:ext uri="{FF2B5EF4-FFF2-40B4-BE49-F238E27FC236}">
-                <a16:creationId xmlns:a16="http://schemas.microsoft.com/office/drawing/2014/main" id="{18C3B467-088C-4F3D-A9A7-105C4E1E20CD}"/>
-              </a:ext>
-            </a:extLst>
-          </p:cNvPr>
-          <p:cNvSpPr>
-            <a:spLocks noGrp="1"/>
-          </p:cNvSpPr>
-          <p:nvPr>
-            <p:ph type="ctrTitle"/>
-          </p:nvPr>
-        </p:nvSpPr>
-        <p:spPr>
-          <a:xfrm>
-            <a:off x="6033793" y="2355458"/>
-            <a:ext cx="4775075" cy="1630907"/>
-          </a:xfrm>
-        </p:spPr>
-        <p:txBody>
-          <a:bodyPr>
-            <a:normAutofit fontScale="90000"/>
-          </a:bodyPr>
-          <a:lstStyle/>
-          <a:p>
-            <a:r>
-              <a:rPr lang="en-US" sz="4400" dirty="0">
-                <a:solidFill>
-                  <a:schemeClr val="tx1"/>
-                </a:solidFill>
-              </a:rPr>
-              <a:t>COMP2</a:t>
-            </a:r>
-            <a:r>
-              <a:rPr lang="en-US" sz="4400" i="1" dirty="0">
-                <a:solidFill>
-                  <a:schemeClr val="tx1"/>
-                </a:solidFill>
-              </a:rPr>
-              <a:t>x</a:t>
-            </a:r>
-            <a:r>
-              <a:rPr lang="en-US" sz="4400" dirty="0">
-                <a:solidFill>
-                  <a:schemeClr val="tx1"/>
-                </a:solidFill>
-              </a:rPr>
-              <a:t>0:</a:t>
-            </a:r>
-            <a:br>
-              <a:rPr lang="en-US" sz="4400" dirty="0">
-                <a:solidFill>
-                  <a:schemeClr val="tx1"/>
-                </a:solidFill>
-              </a:rPr>
-            </a:br>
-            <a:r>
-              <a:rPr lang="en-US" sz="4400" dirty="0">
-                <a:solidFill>
-                  <a:schemeClr val="tx1"/>
-                </a:solidFill>
-              </a:rPr>
-              <a:t>Worksheet support</a:t>
-            </a:r>
-          </a:p>
-        </p:txBody>
-      </p:sp>
       <p:pic>
         <p:nvPicPr>
           <p:cNvPr id="7" name="Picture 6">
@@ -4609,6 +4539,116 @@
           </a:prstGeom>
         </p:spPr>
       </p:pic>
+      <p:sp>
+        <p:nvSpPr>
+          <p:cNvPr id="13" name="Title 1">
+            <a:extLst>
+              <a:ext uri="{FF2B5EF4-FFF2-40B4-BE49-F238E27FC236}">
+                <a16:creationId xmlns:a16="http://schemas.microsoft.com/office/drawing/2014/main" id="{517681B6-2165-47EB-AFF9-F0C7410F6386}"/>
+              </a:ext>
+            </a:extLst>
+          </p:cNvPr>
+          <p:cNvSpPr>
+            <a:spLocks noGrp="1"/>
+          </p:cNvSpPr>
+          <p:nvPr>
+            <p:ph type="ctrTitle"/>
+          </p:nvPr>
+        </p:nvSpPr>
+        <p:spPr>
+          <a:xfrm>
+            <a:off x="6033793" y="2057400"/>
+            <a:ext cx="4775075" cy="2686050"/>
+          </a:xfrm>
+        </p:spPr>
+        <p:txBody>
+          <a:bodyPr>
+            <a:normAutofit fontScale="90000"/>
+          </a:bodyPr>
+          <a:lstStyle/>
+          <a:p>
+            <a:r>
+              <a:rPr lang="en-US" sz="4000" cap="none" dirty="0">
+                <a:solidFill>
+                  <a:schemeClr val="accent5"/>
+                </a:solidFill>
+              </a:rPr>
+              <a:t>COMP2</a:t>
+            </a:r>
+            <a:r>
+              <a:rPr lang="en-US" sz="4000" i="1" cap="none" dirty="0">
+                <a:solidFill>
+                  <a:schemeClr val="accent5"/>
+                </a:solidFill>
+              </a:rPr>
+              <a:t>x</a:t>
+            </a:r>
+            <a:r>
+              <a:rPr lang="en-US" sz="4000" cap="none" dirty="0">
+                <a:solidFill>
+                  <a:schemeClr val="accent5"/>
+                </a:solidFill>
+              </a:rPr>
+              <a:t>0/VR220</a:t>
+            </a:r>
+            <a:br>
+              <a:rPr lang="en-US" sz="4400" cap="none" dirty="0">
+                <a:solidFill>
+                  <a:schemeClr val="tx1"/>
+                </a:solidFill>
+              </a:rPr>
+            </a:br>
+            <a:r>
+              <a:rPr lang="en-US" sz="3600" cap="none" dirty="0">
+                <a:solidFill>
+                  <a:schemeClr val="tx1"/>
+                </a:solidFill>
+              </a:rPr>
+              <a:t>Portfolio Development/</a:t>
+            </a:r>
+            <a:br>
+              <a:rPr lang="en-US" sz="3600" cap="none" dirty="0">
+                <a:solidFill>
+                  <a:schemeClr val="tx1"/>
+                </a:solidFill>
+              </a:rPr>
+            </a:br>
+            <a:r>
+              <a:rPr lang="en-US" sz="3600" cap="none" dirty="0">
+                <a:solidFill>
+                  <a:schemeClr val="tx1"/>
+                </a:solidFill>
+              </a:rPr>
+              <a:t>Worksheet Support</a:t>
+            </a:r>
+            <a:br>
+              <a:rPr lang="en-US" sz="3600" cap="none" dirty="0">
+                <a:solidFill>
+                  <a:schemeClr val="tx1"/>
+                </a:solidFill>
+              </a:rPr>
+            </a:br>
+            <a:br>
+              <a:rPr lang="en-US" sz="4400" cap="none" dirty="0">
+                <a:solidFill>
+                  <a:schemeClr val="tx1"/>
+                </a:solidFill>
+              </a:rPr>
+            </a:br>
+            <a:r>
+              <a:rPr lang="en-US" sz="4400" b="1" cap="none" dirty="0">
+                <a:solidFill>
+                  <a:schemeClr val="accent4">
+                    <a:lumMod val="60000"/>
+                    <a:lumOff val="40000"/>
+                  </a:schemeClr>
+                </a:solidFill>
+              </a:rPr>
+              <a:t>Week 2:</a:t>
+            </a:r>
+          </a:p>
+        </p:txBody>
+      </p:sp>
     </p:spTree>
     <p:extLst>
       <p:ext uri="{BB962C8B-B14F-4D97-AF65-F5344CB8AC3E}">

</xml_diff>